<commit_message>
InfinityStorm 4-1 4-3스테이지 제작
InfinityStorm 4-1 4-3스테이지 제작
</commit_message>
<xml_diff>
--- a/개인작업폴더/유건희/Infinite Strom.pptx
+++ b/개인작업폴더/유건희/Infinite Strom.pptx
@@ -262,7 +262,7 @@
           <a:p>
             <a:fld id="{DEE44FA5-1D27-4C1F-B41C-703A784E8162}" type="datetimeFigureOut">
               <a:rPr lang="ko-KR" altLang="en-US" smtClean="0"/>
-              <a:t>2021-01-25</a:t>
+              <a:t>2021-01-26</a:t>
             </a:fld>
             <a:endParaRPr lang="ko-KR" altLang="en-US"/>
           </a:p>
@@ -460,7 +460,7 @@
           <a:p>
             <a:fld id="{DEE44FA5-1D27-4C1F-B41C-703A784E8162}" type="datetimeFigureOut">
               <a:rPr lang="ko-KR" altLang="en-US" smtClean="0"/>
-              <a:t>2021-01-25</a:t>
+              <a:t>2021-01-26</a:t>
             </a:fld>
             <a:endParaRPr lang="ko-KR" altLang="en-US"/>
           </a:p>
@@ -668,7 +668,7 @@
           <a:p>
             <a:fld id="{DEE44FA5-1D27-4C1F-B41C-703A784E8162}" type="datetimeFigureOut">
               <a:rPr lang="ko-KR" altLang="en-US" smtClean="0"/>
-              <a:t>2021-01-25</a:t>
+              <a:t>2021-01-26</a:t>
             </a:fld>
             <a:endParaRPr lang="ko-KR" altLang="en-US"/>
           </a:p>
@@ -866,7 +866,7 @@
           <a:p>
             <a:fld id="{DEE44FA5-1D27-4C1F-B41C-703A784E8162}" type="datetimeFigureOut">
               <a:rPr lang="ko-KR" altLang="en-US" smtClean="0"/>
-              <a:t>2021-01-25</a:t>
+              <a:t>2021-01-26</a:t>
             </a:fld>
             <a:endParaRPr lang="ko-KR" altLang="en-US"/>
           </a:p>
@@ -1141,7 +1141,7 @@
           <a:p>
             <a:fld id="{DEE44FA5-1D27-4C1F-B41C-703A784E8162}" type="datetimeFigureOut">
               <a:rPr lang="ko-KR" altLang="en-US" smtClean="0"/>
-              <a:t>2021-01-25</a:t>
+              <a:t>2021-01-26</a:t>
             </a:fld>
             <a:endParaRPr lang="ko-KR" altLang="en-US"/>
           </a:p>
@@ -1406,7 +1406,7 @@
           <a:p>
             <a:fld id="{DEE44FA5-1D27-4C1F-B41C-703A784E8162}" type="datetimeFigureOut">
               <a:rPr lang="ko-KR" altLang="en-US" smtClean="0"/>
-              <a:t>2021-01-25</a:t>
+              <a:t>2021-01-26</a:t>
             </a:fld>
             <a:endParaRPr lang="ko-KR" altLang="en-US"/>
           </a:p>
@@ -1818,7 +1818,7 @@
           <a:p>
             <a:fld id="{DEE44FA5-1D27-4C1F-B41C-703A784E8162}" type="datetimeFigureOut">
               <a:rPr lang="ko-KR" altLang="en-US" smtClean="0"/>
-              <a:t>2021-01-25</a:t>
+              <a:t>2021-01-26</a:t>
             </a:fld>
             <a:endParaRPr lang="ko-KR" altLang="en-US"/>
           </a:p>
@@ -1959,7 +1959,7 @@
           <a:p>
             <a:fld id="{DEE44FA5-1D27-4C1F-B41C-703A784E8162}" type="datetimeFigureOut">
               <a:rPr lang="ko-KR" altLang="en-US" smtClean="0"/>
-              <a:t>2021-01-25</a:t>
+              <a:t>2021-01-26</a:t>
             </a:fld>
             <a:endParaRPr lang="ko-KR" altLang="en-US"/>
           </a:p>
@@ -2072,7 +2072,7 @@
           <a:p>
             <a:fld id="{DEE44FA5-1D27-4C1F-B41C-703A784E8162}" type="datetimeFigureOut">
               <a:rPr lang="ko-KR" altLang="en-US" smtClean="0"/>
-              <a:t>2021-01-25</a:t>
+              <a:t>2021-01-26</a:t>
             </a:fld>
             <a:endParaRPr lang="ko-KR" altLang="en-US"/>
           </a:p>
@@ -2383,7 +2383,7 @@
           <a:p>
             <a:fld id="{DEE44FA5-1D27-4C1F-B41C-703A784E8162}" type="datetimeFigureOut">
               <a:rPr lang="ko-KR" altLang="en-US" smtClean="0"/>
-              <a:t>2021-01-25</a:t>
+              <a:t>2021-01-26</a:t>
             </a:fld>
             <a:endParaRPr lang="ko-KR" altLang="en-US"/>
           </a:p>
@@ -2671,7 +2671,7 @@
           <a:p>
             <a:fld id="{DEE44FA5-1D27-4C1F-B41C-703A784E8162}" type="datetimeFigureOut">
               <a:rPr lang="ko-KR" altLang="en-US" smtClean="0"/>
-              <a:t>2021-01-25</a:t>
+              <a:t>2021-01-26</a:t>
             </a:fld>
             <a:endParaRPr lang="ko-KR" altLang="en-US"/>
           </a:p>
@@ -2912,7 +2912,7 @@
           <a:p>
             <a:fld id="{DEE44FA5-1D27-4C1F-B41C-703A784E8162}" type="datetimeFigureOut">
               <a:rPr lang="ko-KR" altLang="en-US" smtClean="0"/>
-              <a:t>2021-01-25</a:t>
+              <a:t>2021-01-26</a:t>
             </a:fld>
             <a:endParaRPr lang="ko-KR" altLang="en-US"/>
           </a:p>
@@ -13315,60 +13315,6 @@
       </p:pic>
       <p:sp>
         <p:nvSpPr>
-          <p:cNvPr id="2" name="나누기 기호 1">
-            <a:extLst>
-              <a:ext uri="{FF2B5EF4-FFF2-40B4-BE49-F238E27FC236}">
-                <a16:creationId xmlns:a16="http://schemas.microsoft.com/office/drawing/2014/main" id="{A94AF730-522F-41FD-AD10-E5D9592F41E1}"/>
-              </a:ext>
-            </a:extLst>
-          </p:cNvPr>
-          <p:cNvSpPr/>
-          <p:nvPr/>
-        </p:nvSpPr>
-        <p:spPr>
-          <a:xfrm rot="5400000">
-            <a:off x="576922" y="5527527"/>
-            <a:ext cx="433942" cy="379985"/>
-          </a:xfrm>
-          <a:prstGeom prst="mathDivide">
-            <a:avLst/>
-          </a:prstGeom>
-          <a:solidFill>
-            <a:srgbClr val="00B0F0"/>
-          </a:solidFill>
-          <a:ln>
-            <a:solidFill>
-              <a:schemeClr val="tx1"/>
-            </a:solidFill>
-          </a:ln>
-        </p:spPr>
-        <p:style>
-          <a:lnRef idx="2">
-            <a:schemeClr val="accent1">
-              <a:shade val="50000"/>
-            </a:schemeClr>
-          </a:lnRef>
-          <a:fillRef idx="1">
-            <a:schemeClr val="accent1"/>
-          </a:fillRef>
-          <a:effectRef idx="0">
-            <a:schemeClr val="accent1"/>
-          </a:effectRef>
-          <a:fontRef idx="minor">
-            <a:schemeClr val="lt1"/>
-          </a:fontRef>
-        </p:style>
-        <p:txBody>
-          <a:bodyPr rtlCol="0" anchor="ctr"/>
-          <a:lstStyle/>
-          <a:p>
-            <a:pPr algn="ctr"/>
-            <a:endParaRPr lang="ko-KR" altLang="en-US" dirty="0"/>
-          </a:p>
-        </p:txBody>
-      </p:sp>
-      <p:sp>
-        <p:nvSpPr>
           <p:cNvPr id="53" name="직사각형 52">
             <a:extLst>
               <a:ext uri="{FF2B5EF4-FFF2-40B4-BE49-F238E27FC236}">
@@ -14695,60 +14641,6 @@
       </p:pic>
       <p:sp>
         <p:nvSpPr>
-          <p:cNvPr id="99" name="나누기 기호 98">
-            <a:extLst>
-              <a:ext uri="{FF2B5EF4-FFF2-40B4-BE49-F238E27FC236}">
-                <a16:creationId xmlns:a16="http://schemas.microsoft.com/office/drawing/2014/main" id="{7E6128B2-29BA-496C-AB31-72016275150A}"/>
-              </a:ext>
-            </a:extLst>
-          </p:cNvPr>
-          <p:cNvSpPr/>
-          <p:nvPr/>
-        </p:nvSpPr>
-        <p:spPr>
-          <a:xfrm rot="5400000">
-            <a:off x="6735681" y="5492593"/>
-            <a:ext cx="433942" cy="379985"/>
-          </a:xfrm>
-          <a:prstGeom prst="mathDivide">
-            <a:avLst/>
-          </a:prstGeom>
-          <a:solidFill>
-            <a:srgbClr val="00B0F0"/>
-          </a:solidFill>
-          <a:ln>
-            <a:solidFill>
-              <a:schemeClr val="tx1"/>
-            </a:solidFill>
-          </a:ln>
-        </p:spPr>
-        <p:style>
-          <a:lnRef idx="2">
-            <a:schemeClr val="accent1">
-              <a:shade val="50000"/>
-            </a:schemeClr>
-          </a:lnRef>
-          <a:fillRef idx="1">
-            <a:schemeClr val="accent1"/>
-          </a:fillRef>
-          <a:effectRef idx="0">
-            <a:schemeClr val="accent1"/>
-          </a:effectRef>
-          <a:fontRef idx="minor">
-            <a:schemeClr val="lt1"/>
-          </a:fontRef>
-        </p:style>
-        <p:txBody>
-          <a:bodyPr rtlCol="0" anchor="ctr"/>
-          <a:lstStyle/>
-          <a:p>
-            <a:pPr algn="ctr"/>
-            <a:endParaRPr lang="ko-KR" altLang="en-US" dirty="0"/>
-          </a:p>
-        </p:txBody>
-      </p:sp>
-      <p:sp>
-        <p:nvSpPr>
           <p:cNvPr id="100" name="직사각형 99">
             <a:extLst>
               <a:ext uri="{FF2B5EF4-FFF2-40B4-BE49-F238E27FC236}">
@@ -15784,6 +15676,402 @@
               <a:rPr lang="ko-KR" altLang="en-US" sz="1400" b="1" dirty="0"/>
               <a:t> 출구까지 이동하면 클리어</a:t>
             </a:r>
+          </a:p>
+        </p:txBody>
+      </p:sp>
+      <p:grpSp>
+        <p:nvGrpSpPr>
+          <p:cNvPr id="13" name="그룹 12">
+            <a:extLst>
+              <a:ext uri="{FF2B5EF4-FFF2-40B4-BE49-F238E27FC236}">
+                <a16:creationId xmlns:a16="http://schemas.microsoft.com/office/drawing/2014/main" id="{21EAF21F-C123-44D2-8981-17C18B09FAB3}"/>
+              </a:ext>
+            </a:extLst>
+          </p:cNvPr>
+          <p:cNvGrpSpPr/>
+          <p:nvPr/>
+        </p:nvGrpSpPr>
+        <p:grpSpPr>
+          <a:xfrm>
+            <a:off x="672587" y="5699603"/>
+            <a:ext cx="433942" cy="346424"/>
+            <a:chOff x="5551055" y="1465499"/>
+            <a:chExt cx="605532" cy="769456"/>
+          </a:xfrm>
+        </p:grpSpPr>
+        <p:sp>
+          <p:nvSpPr>
+            <p:cNvPr id="9" name="직사각형 8">
+              <a:extLst>
+                <a:ext uri="{FF2B5EF4-FFF2-40B4-BE49-F238E27FC236}">
+                  <a16:creationId xmlns:a16="http://schemas.microsoft.com/office/drawing/2014/main" id="{50547E7B-AEB8-4A0B-AD04-C3953C5D9E24}"/>
+                </a:ext>
+              </a:extLst>
+            </p:cNvPr>
+            <p:cNvSpPr/>
+            <p:nvPr/>
+          </p:nvSpPr>
+          <p:spPr>
+            <a:xfrm rot="19416166">
+              <a:off x="5581695" y="1735695"/>
+              <a:ext cx="351037" cy="118941"/>
+            </a:xfrm>
+            <a:prstGeom prst="rect">
+              <a:avLst/>
+            </a:prstGeom>
+            <a:solidFill>
+              <a:schemeClr val="accent3"/>
+            </a:solidFill>
+            <a:ln>
+              <a:noFill/>
+            </a:ln>
+          </p:spPr>
+          <p:style>
+            <a:lnRef idx="2">
+              <a:schemeClr val="accent1">
+                <a:shade val="50000"/>
+              </a:schemeClr>
+            </a:lnRef>
+            <a:fillRef idx="1">
+              <a:schemeClr val="accent1"/>
+            </a:fillRef>
+            <a:effectRef idx="0">
+              <a:schemeClr val="accent1"/>
+            </a:effectRef>
+            <a:fontRef idx="minor">
+              <a:schemeClr val="lt1"/>
+            </a:fontRef>
+          </p:style>
+          <p:txBody>
+            <a:bodyPr rtlCol="0" anchor="ctr"/>
+            <a:lstStyle/>
+            <a:p>
+              <a:pPr algn="ctr"/>
+              <a:endParaRPr lang="ko-KR" altLang="en-US"/>
+            </a:p>
+          </p:txBody>
+        </p:sp>
+        <p:sp>
+          <p:nvSpPr>
+            <p:cNvPr id="10" name="타원 9">
+              <a:extLst>
+                <a:ext uri="{FF2B5EF4-FFF2-40B4-BE49-F238E27FC236}">
+                  <a16:creationId xmlns:a16="http://schemas.microsoft.com/office/drawing/2014/main" id="{CE5A5E28-4128-4C99-B06A-F4CBC9212423}"/>
+                </a:ext>
+              </a:extLst>
+            </p:cNvPr>
+            <p:cNvSpPr/>
+            <p:nvPr/>
+          </p:nvSpPr>
+          <p:spPr>
+            <a:xfrm>
+              <a:off x="5853525" y="1465499"/>
+              <a:ext cx="303062" cy="303062"/>
+            </a:xfrm>
+            <a:prstGeom prst="ellipse">
+              <a:avLst/>
+            </a:prstGeom>
+            <a:solidFill>
+              <a:srgbClr val="FF0000"/>
+            </a:solidFill>
+            <a:ln>
+              <a:noFill/>
+            </a:ln>
+          </p:spPr>
+          <p:style>
+            <a:lnRef idx="2">
+              <a:schemeClr val="accent1">
+                <a:shade val="50000"/>
+              </a:schemeClr>
+            </a:lnRef>
+            <a:fillRef idx="1">
+              <a:schemeClr val="accent1"/>
+            </a:fillRef>
+            <a:effectRef idx="0">
+              <a:schemeClr val="accent1"/>
+            </a:effectRef>
+            <a:fontRef idx="minor">
+              <a:schemeClr val="lt1"/>
+            </a:fontRef>
+          </p:style>
+          <p:txBody>
+            <a:bodyPr rtlCol="0" anchor="ctr"/>
+            <a:lstStyle/>
+            <a:p>
+              <a:pPr algn="ctr"/>
+              <a:endParaRPr lang="ko-KR" altLang="en-US" dirty="0"/>
+            </a:p>
+          </p:txBody>
+        </p:sp>
+        <p:sp>
+          <p:nvSpPr>
+            <p:cNvPr id="8" name="직사각형 7">
+              <a:extLst>
+                <a:ext uri="{FF2B5EF4-FFF2-40B4-BE49-F238E27FC236}">
+                  <a16:creationId xmlns:a16="http://schemas.microsoft.com/office/drawing/2014/main" id="{21EA7D79-6BD5-4E6A-98CE-775C5DC7570A}"/>
+                </a:ext>
+              </a:extLst>
+            </p:cNvPr>
+            <p:cNvSpPr/>
+            <p:nvPr/>
+          </p:nvSpPr>
+          <p:spPr>
+            <a:xfrm>
+              <a:off x="5551055" y="1496291"/>
+              <a:ext cx="166254" cy="738664"/>
+            </a:xfrm>
+            <a:prstGeom prst="rect">
+              <a:avLst/>
+            </a:prstGeom>
+            <a:solidFill>
+              <a:schemeClr val="tx1"/>
+            </a:solidFill>
+            <a:ln>
+              <a:noFill/>
+            </a:ln>
+          </p:spPr>
+          <p:style>
+            <a:lnRef idx="2">
+              <a:schemeClr val="accent1">
+                <a:shade val="50000"/>
+              </a:schemeClr>
+            </a:lnRef>
+            <a:fillRef idx="1">
+              <a:schemeClr val="accent1"/>
+            </a:fillRef>
+            <a:effectRef idx="0">
+              <a:schemeClr val="accent1"/>
+            </a:effectRef>
+            <a:fontRef idx="minor">
+              <a:schemeClr val="lt1"/>
+            </a:fontRef>
+          </p:style>
+          <p:txBody>
+            <a:bodyPr rtlCol="0" anchor="ctr"/>
+            <a:lstStyle/>
+            <a:p>
+              <a:pPr algn="ctr"/>
+              <a:endParaRPr lang="ko-KR" altLang="en-US"/>
+            </a:p>
+          </p:txBody>
+        </p:sp>
+      </p:grpSp>
+      <p:grpSp>
+        <p:nvGrpSpPr>
+          <p:cNvPr id="12" name="그룹 11">
+            <a:extLst>
+              <a:ext uri="{FF2B5EF4-FFF2-40B4-BE49-F238E27FC236}">
+                <a16:creationId xmlns:a16="http://schemas.microsoft.com/office/drawing/2014/main" id="{389BB87B-0E9A-4B92-A290-2B940ABD11E4}"/>
+              </a:ext>
+            </a:extLst>
+          </p:cNvPr>
+          <p:cNvGrpSpPr/>
+          <p:nvPr/>
+        </p:nvGrpSpPr>
+        <p:grpSpPr>
+          <a:xfrm>
+            <a:off x="6787387" y="5580633"/>
+            <a:ext cx="386122" cy="276327"/>
+            <a:chOff x="6391566" y="1496291"/>
+            <a:chExt cx="552764" cy="738664"/>
+          </a:xfrm>
+        </p:grpSpPr>
+        <p:sp>
+          <p:nvSpPr>
+            <p:cNvPr id="66" name="직사각형 65">
+              <a:extLst>
+                <a:ext uri="{FF2B5EF4-FFF2-40B4-BE49-F238E27FC236}">
+                  <a16:creationId xmlns:a16="http://schemas.microsoft.com/office/drawing/2014/main" id="{7DBE901F-C358-421B-BC74-61E4324D0C48}"/>
+                </a:ext>
+              </a:extLst>
+            </p:cNvPr>
+            <p:cNvSpPr/>
+            <p:nvPr/>
+          </p:nvSpPr>
+          <p:spPr>
+            <a:xfrm rot="2550776">
+              <a:off x="6438687" y="1838439"/>
+              <a:ext cx="351037" cy="118941"/>
+            </a:xfrm>
+            <a:prstGeom prst="rect">
+              <a:avLst/>
+            </a:prstGeom>
+            <a:solidFill>
+              <a:schemeClr val="accent3"/>
+            </a:solidFill>
+            <a:ln>
+              <a:noFill/>
+            </a:ln>
+          </p:spPr>
+          <p:style>
+            <a:lnRef idx="2">
+              <a:schemeClr val="accent1">
+                <a:shade val="50000"/>
+              </a:schemeClr>
+            </a:lnRef>
+            <a:fillRef idx="1">
+              <a:schemeClr val="accent1"/>
+            </a:fillRef>
+            <a:effectRef idx="0">
+              <a:schemeClr val="accent1"/>
+            </a:effectRef>
+            <a:fontRef idx="minor">
+              <a:schemeClr val="lt1"/>
+            </a:fontRef>
+          </p:style>
+          <p:txBody>
+            <a:bodyPr rtlCol="0" anchor="ctr"/>
+            <a:lstStyle/>
+            <a:p>
+              <a:pPr algn="ctr"/>
+              <a:endParaRPr lang="ko-KR" altLang="en-US"/>
+            </a:p>
+          </p:txBody>
+        </p:sp>
+        <p:sp>
+          <p:nvSpPr>
+            <p:cNvPr id="67" name="타원 66">
+              <a:extLst>
+                <a:ext uri="{FF2B5EF4-FFF2-40B4-BE49-F238E27FC236}">
+                  <a16:creationId xmlns:a16="http://schemas.microsoft.com/office/drawing/2014/main" id="{F045CB65-3DB6-455B-B4E0-3A9D4D0E8CB9}"/>
+                </a:ext>
+              </a:extLst>
+            </p:cNvPr>
+            <p:cNvSpPr/>
+            <p:nvPr/>
+          </p:nvSpPr>
+          <p:spPr>
+            <a:xfrm>
+              <a:off x="6641268" y="1897612"/>
+              <a:ext cx="303062" cy="303062"/>
+            </a:xfrm>
+            <a:prstGeom prst="ellipse">
+              <a:avLst/>
+            </a:prstGeom>
+            <a:solidFill>
+              <a:srgbClr val="FF0000"/>
+            </a:solidFill>
+            <a:ln>
+              <a:noFill/>
+            </a:ln>
+          </p:spPr>
+          <p:style>
+            <a:lnRef idx="2">
+              <a:schemeClr val="accent1">
+                <a:shade val="50000"/>
+              </a:schemeClr>
+            </a:lnRef>
+            <a:fillRef idx="1">
+              <a:schemeClr val="accent1"/>
+            </a:fillRef>
+            <a:effectRef idx="0">
+              <a:schemeClr val="accent1"/>
+            </a:effectRef>
+            <a:fontRef idx="minor">
+              <a:schemeClr val="lt1"/>
+            </a:fontRef>
+          </p:style>
+          <p:txBody>
+            <a:bodyPr rtlCol="0" anchor="ctr"/>
+            <a:lstStyle/>
+            <a:p>
+              <a:pPr algn="ctr"/>
+              <a:endParaRPr lang="ko-KR" altLang="en-US" dirty="0"/>
+            </a:p>
+          </p:txBody>
+        </p:sp>
+        <p:sp>
+          <p:nvSpPr>
+            <p:cNvPr id="68" name="직사각형 67">
+              <a:extLst>
+                <a:ext uri="{FF2B5EF4-FFF2-40B4-BE49-F238E27FC236}">
+                  <a16:creationId xmlns:a16="http://schemas.microsoft.com/office/drawing/2014/main" id="{CF4E4EC7-8C58-41F3-BEA3-186AF4CE929A}"/>
+                </a:ext>
+              </a:extLst>
+            </p:cNvPr>
+            <p:cNvSpPr/>
+            <p:nvPr/>
+          </p:nvSpPr>
+          <p:spPr>
+            <a:xfrm>
+              <a:off x="6391566" y="1496291"/>
+              <a:ext cx="166254" cy="738664"/>
+            </a:xfrm>
+            <a:prstGeom prst="rect">
+              <a:avLst/>
+            </a:prstGeom>
+            <a:solidFill>
+              <a:schemeClr val="tx1"/>
+            </a:solidFill>
+            <a:ln>
+              <a:noFill/>
+            </a:ln>
+          </p:spPr>
+          <p:style>
+            <a:lnRef idx="2">
+              <a:schemeClr val="accent1">
+                <a:shade val="50000"/>
+              </a:schemeClr>
+            </a:lnRef>
+            <a:fillRef idx="1">
+              <a:schemeClr val="accent1"/>
+            </a:fillRef>
+            <a:effectRef idx="0">
+              <a:schemeClr val="accent1"/>
+            </a:effectRef>
+            <a:fontRef idx="minor">
+              <a:schemeClr val="lt1"/>
+            </a:fontRef>
+          </p:style>
+          <p:txBody>
+            <a:bodyPr rtlCol="0" anchor="ctr"/>
+            <a:lstStyle/>
+            <a:p>
+              <a:pPr algn="ctr"/>
+              <a:endParaRPr lang="ko-KR" altLang="en-US"/>
+            </a:p>
+          </p:txBody>
+        </p:sp>
+      </p:grpSp>
+      <p:sp>
+        <p:nvSpPr>
+          <p:cNvPr id="71" name="TextBox 70">
+            <a:extLst>
+              <a:ext uri="{FF2B5EF4-FFF2-40B4-BE49-F238E27FC236}">
+                <a16:creationId xmlns:a16="http://schemas.microsoft.com/office/drawing/2014/main" id="{AE6FFB3D-92D0-4590-A370-4F8CFD6DA549}"/>
+              </a:ext>
+            </a:extLst>
+          </p:cNvPr>
+          <p:cNvSpPr txBox="1"/>
+          <p:nvPr/>
+        </p:nvSpPr>
+        <p:spPr>
+          <a:xfrm>
+            <a:off x="4374590" y="1587478"/>
+            <a:ext cx="950636" cy="307777"/>
+          </a:xfrm>
+          <a:prstGeom prst="rect">
+            <a:avLst/>
+          </a:prstGeom>
+          <a:noFill/>
+        </p:spPr>
+        <p:txBody>
+          <a:bodyPr wrap="square" rtlCol="0">
+            <a:spAutoFit/>
+          </a:bodyPr>
+          <a:lstStyle/>
+          <a:p>
+            <a:r>
+              <a:rPr lang="en-US" altLang="ko-KR" sz="1400" b="1" dirty="0">
+                <a:latin typeface="메이플스토리" panose="02000300000000000000" pitchFamily="2" charset="-127"/>
+                <a:ea typeface="메이플스토리" panose="02000300000000000000" pitchFamily="2" charset="-127"/>
+              </a:rPr>
+              <a:t>Touch!!</a:t>
+            </a:r>
+            <a:endParaRPr lang="ko-KR" altLang="en-US" sz="1400" b="1" dirty="0">
+              <a:latin typeface="메이플스토리" panose="02000300000000000000" pitchFamily="2" charset="-127"/>
+              <a:ea typeface="메이플스토리" panose="02000300000000000000" pitchFamily="2" charset="-127"/>
+            </a:endParaRPr>
           </a:p>
         </p:txBody>
       </p:sp>

</xml_diff>

<commit_message>
InfinityStorm 4-1, 4-2, 4-3 제작
InfinityStorm 4-1, 4-2, 4-3 제작
</commit_message>
<xml_diff>
--- a/개인작업폴더/유건희/Infinite Strom.pptx
+++ b/개인작업폴더/유건희/Infinite Strom.pptx
@@ -9,6 +9,7 @@
     <p:sldId id="257" r:id="rId3"/>
     <p:sldId id="259" r:id="rId4"/>
     <p:sldId id="258" r:id="rId5"/>
+    <p:sldId id="260" r:id="rId6"/>
   </p:sldIdLst>
   <p:sldSz cx="12192000" cy="6858000"/>
   <p:notesSz cx="6858000" cy="9144000"/>
@@ -262,7 +263,7 @@
           <a:p>
             <a:fld id="{DEE44FA5-1D27-4C1F-B41C-703A784E8162}" type="datetimeFigureOut">
               <a:rPr lang="ko-KR" altLang="en-US" smtClean="0"/>
-              <a:t>2021-01-26</a:t>
+              <a:t>2021-01-27</a:t>
             </a:fld>
             <a:endParaRPr lang="ko-KR" altLang="en-US"/>
           </a:p>
@@ -460,7 +461,7 @@
           <a:p>
             <a:fld id="{DEE44FA5-1D27-4C1F-B41C-703A784E8162}" type="datetimeFigureOut">
               <a:rPr lang="ko-KR" altLang="en-US" smtClean="0"/>
-              <a:t>2021-01-26</a:t>
+              <a:t>2021-01-27</a:t>
             </a:fld>
             <a:endParaRPr lang="ko-KR" altLang="en-US"/>
           </a:p>
@@ -668,7 +669,7 @@
           <a:p>
             <a:fld id="{DEE44FA5-1D27-4C1F-B41C-703A784E8162}" type="datetimeFigureOut">
               <a:rPr lang="ko-KR" altLang="en-US" smtClean="0"/>
-              <a:t>2021-01-26</a:t>
+              <a:t>2021-01-27</a:t>
             </a:fld>
             <a:endParaRPr lang="ko-KR" altLang="en-US"/>
           </a:p>
@@ -866,7 +867,7 @@
           <a:p>
             <a:fld id="{DEE44FA5-1D27-4C1F-B41C-703A784E8162}" type="datetimeFigureOut">
               <a:rPr lang="ko-KR" altLang="en-US" smtClean="0"/>
-              <a:t>2021-01-26</a:t>
+              <a:t>2021-01-27</a:t>
             </a:fld>
             <a:endParaRPr lang="ko-KR" altLang="en-US"/>
           </a:p>
@@ -1141,7 +1142,7 @@
           <a:p>
             <a:fld id="{DEE44FA5-1D27-4C1F-B41C-703A784E8162}" type="datetimeFigureOut">
               <a:rPr lang="ko-KR" altLang="en-US" smtClean="0"/>
-              <a:t>2021-01-26</a:t>
+              <a:t>2021-01-27</a:t>
             </a:fld>
             <a:endParaRPr lang="ko-KR" altLang="en-US"/>
           </a:p>
@@ -1406,7 +1407,7 @@
           <a:p>
             <a:fld id="{DEE44FA5-1D27-4C1F-B41C-703A784E8162}" type="datetimeFigureOut">
               <a:rPr lang="ko-KR" altLang="en-US" smtClean="0"/>
-              <a:t>2021-01-26</a:t>
+              <a:t>2021-01-27</a:t>
             </a:fld>
             <a:endParaRPr lang="ko-KR" altLang="en-US"/>
           </a:p>
@@ -1818,7 +1819,7 @@
           <a:p>
             <a:fld id="{DEE44FA5-1D27-4C1F-B41C-703A784E8162}" type="datetimeFigureOut">
               <a:rPr lang="ko-KR" altLang="en-US" smtClean="0"/>
-              <a:t>2021-01-26</a:t>
+              <a:t>2021-01-27</a:t>
             </a:fld>
             <a:endParaRPr lang="ko-KR" altLang="en-US"/>
           </a:p>
@@ -1959,7 +1960,7 @@
           <a:p>
             <a:fld id="{DEE44FA5-1D27-4C1F-B41C-703A784E8162}" type="datetimeFigureOut">
               <a:rPr lang="ko-KR" altLang="en-US" smtClean="0"/>
-              <a:t>2021-01-26</a:t>
+              <a:t>2021-01-27</a:t>
             </a:fld>
             <a:endParaRPr lang="ko-KR" altLang="en-US"/>
           </a:p>
@@ -2072,7 +2073,7 @@
           <a:p>
             <a:fld id="{DEE44FA5-1D27-4C1F-B41C-703A784E8162}" type="datetimeFigureOut">
               <a:rPr lang="ko-KR" altLang="en-US" smtClean="0"/>
-              <a:t>2021-01-26</a:t>
+              <a:t>2021-01-27</a:t>
             </a:fld>
             <a:endParaRPr lang="ko-KR" altLang="en-US"/>
           </a:p>
@@ -2383,7 +2384,7 @@
           <a:p>
             <a:fld id="{DEE44FA5-1D27-4C1F-B41C-703A784E8162}" type="datetimeFigureOut">
               <a:rPr lang="ko-KR" altLang="en-US" smtClean="0"/>
-              <a:t>2021-01-26</a:t>
+              <a:t>2021-01-27</a:t>
             </a:fld>
             <a:endParaRPr lang="ko-KR" altLang="en-US"/>
           </a:p>
@@ -2671,7 +2672,7 @@
           <a:p>
             <a:fld id="{DEE44FA5-1D27-4C1F-B41C-703A784E8162}" type="datetimeFigureOut">
               <a:rPr lang="ko-KR" altLang="en-US" smtClean="0"/>
-              <a:t>2021-01-26</a:t>
+              <a:t>2021-01-27</a:t>
             </a:fld>
             <a:endParaRPr lang="ko-KR" altLang="en-US"/>
           </a:p>
@@ -2912,7 +2913,7 @@
           <a:p>
             <a:fld id="{DEE44FA5-1D27-4C1F-B41C-703A784E8162}" type="datetimeFigureOut">
               <a:rPr lang="ko-KR" altLang="en-US" smtClean="0"/>
-              <a:t>2021-01-26</a:t>
+              <a:t>2021-01-27</a:t>
             </a:fld>
             <a:endParaRPr lang="ko-KR" altLang="en-US"/>
           </a:p>
@@ -12267,6 +12268,542 @@
           </a:p>
         </p:txBody>
       </p:sp>
+      <p:grpSp>
+        <p:nvGrpSpPr>
+          <p:cNvPr id="129" name="그룹 128">
+            <a:extLst>
+              <a:ext uri="{FF2B5EF4-FFF2-40B4-BE49-F238E27FC236}">
+                <a16:creationId xmlns:a16="http://schemas.microsoft.com/office/drawing/2014/main" id="{23CC749F-B20A-4CFF-8CF1-C86A11EF19D1}"/>
+              </a:ext>
+            </a:extLst>
+          </p:cNvPr>
+          <p:cNvGrpSpPr/>
+          <p:nvPr/>
+        </p:nvGrpSpPr>
+        <p:grpSpPr>
+          <a:xfrm>
+            <a:off x="5000994" y="1570747"/>
+            <a:ext cx="345385" cy="342890"/>
+            <a:chOff x="2583977" y="2018169"/>
+            <a:chExt cx="345385" cy="342890"/>
+          </a:xfrm>
+        </p:grpSpPr>
+        <p:sp>
+          <p:nvSpPr>
+            <p:cNvPr id="141" name="직사각형 140">
+              <a:extLst>
+                <a:ext uri="{FF2B5EF4-FFF2-40B4-BE49-F238E27FC236}">
+                  <a16:creationId xmlns:a16="http://schemas.microsoft.com/office/drawing/2014/main" id="{CCA5D7AC-FA1D-467E-954B-058E55E834FA}"/>
+                </a:ext>
+              </a:extLst>
+            </p:cNvPr>
+            <p:cNvSpPr/>
+            <p:nvPr/>
+          </p:nvSpPr>
+          <p:spPr>
+            <a:xfrm flipV="1">
+              <a:off x="2583977" y="2018169"/>
+              <a:ext cx="345385" cy="342890"/>
+            </a:xfrm>
+            <a:prstGeom prst="rect">
+              <a:avLst/>
+            </a:prstGeom>
+            <a:solidFill>
+              <a:schemeClr val="accent4">
+                <a:lumMod val="40000"/>
+                <a:lumOff val="60000"/>
+              </a:schemeClr>
+            </a:solidFill>
+            <a:ln>
+              <a:solidFill>
+                <a:schemeClr val="bg1"/>
+              </a:solidFill>
+            </a:ln>
+          </p:spPr>
+          <p:style>
+            <a:lnRef idx="2">
+              <a:schemeClr val="accent1">
+                <a:shade val="50000"/>
+              </a:schemeClr>
+            </a:lnRef>
+            <a:fillRef idx="1">
+              <a:schemeClr val="accent1"/>
+            </a:fillRef>
+            <a:effectRef idx="0">
+              <a:schemeClr val="accent1"/>
+            </a:effectRef>
+            <a:fontRef idx="minor">
+              <a:schemeClr val="lt1"/>
+            </a:fontRef>
+          </p:style>
+          <p:txBody>
+            <a:bodyPr rtlCol="0" anchor="ctr"/>
+            <a:lstStyle/>
+            <a:p>
+              <a:pPr algn="ctr"/>
+              <a:endParaRPr lang="ko-KR" altLang="en-US" dirty="0"/>
+            </a:p>
+          </p:txBody>
+        </p:sp>
+        <p:sp>
+          <p:nvSpPr>
+            <p:cNvPr id="146" name="화살표: 위쪽 145">
+              <a:extLst>
+                <a:ext uri="{FF2B5EF4-FFF2-40B4-BE49-F238E27FC236}">
+                  <a16:creationId xmlns:a16="http://schemas.microsoft.com/office/drawing/2014/main" id="{CB5E955A-9569-41EA-8DF0-822038702474}"/>
+                </a:ext>
+              </a:extLst>
+            </p:cNvPr>
+            <p:cNvSpPr/>
+            <p:nvPr/>
+          </p:nvSpPr>
+          <p:spPr>
+            <a:xfrm>
+              <a:off x="2688972" y="2075595"/>
+              <a:ext cx="160014" cy="212768"/>
+            </a:xfrm>
+            <a:prstGeom prst="upArrow">
+              <a:avLst/>
+            </a:prstGeom>
+            <a:solidFill>
+              <a:srgbClr val="FF0000"/>
+            </a:solidFill>
+            <a:ln>
+              <a:solidFill>
+                <a:schemeClr val="bg2">
+                  <a:lumMod val="25000"/>
+                </a:schemeClr>
+              </a:solidFill>
+            </a:ln>
+          </p:spPr>
+          <p:style>
+            <a:lnRef idx="2">
+              <a:schemeClr val="accent1">
+                <a:shade val="50000"/>
+              </a:schemeClr>
+            </a:lnRef>
+            <a:fillRef idx="1">
+              <a:schemeClr val="accent1"/>
+            </a:fillRef>
+            <a:effectRef idx="0">
+              <a:schemeClr val="accent1"/>
+            </a:effectRef>
+            <a:fontRef idx="minor">
+              <a:schemeClr val="lt1"/>
+            </a:fontRef>
+          </p:style>
+          <p:txBody>
+            <a:bodyPr rtlCol="0" anchor="ctr"/>
+            <a:lstStyle/>
+            <a:p>
+              <a:pPr algn="ctr"/>
+              <a:endParaRPr lang="ko-KR" altLang="en-US"/>
+            </a:p>
+          </p:txBody>
+        </p:sp>
+      </p:grpSp>
+      <p:grpSp>
+        <p:nvGrpSpPr>
+          <p:cNvPr id="147" name="그룹 146">
+            <a:extLst>
+              <a:ext uri="{FF2B5EF4-FFF2-40B4-BE49-F238E27FC236}">
+                <a16:creationId xmlns:a16="http://schemas.microsoft.com/office/drawing/2014/main" id="{284CC947-348B-4654-A8CB-F3C0EFE5BEAA}"/>
+              </a:ext>
+            </a:extLst>
+          </p:cNvPr>
+          <p:cNvGrpSpPr/>
+          <p:nvPr/>
+        </p:nvGrpSpPr>
+        <p:grpSpPr>
+          <a:xfrm>
+            <a:off x="5819889" y="1570747"/>
+            <a:ext cx="345385" cy="342890"/>
+            <a:chOff x="3402872" y="2018169"/>
+            <a:chExt cx="345385" cy="342890"/>
+          </a:xfrm>
+        </p:grpSpPr>
+        <p:sp>
+          <p:nvSpPr>
+            <p:cNvPr id="148" name="직사각형 147">
+              <a:extLst>
+                <a:ext uri="{FF2B5EF4-FFF2-40B4-BE49-F238E27FC236}">
+                  <a16:creationId xmlns:a16="http://schemas.microsoft.com/office/drawing/2014/main" id="{4815CB83-1515-4DDB-91E6-351A1DAD6914}"/>
+                </a:ext>
+              </a:extLst>
+            </p:cNvPr>
+            <p:cNvSpPr/>
+            <p:nvPr/>
+          </p:nvSpPr>
+          <p:spPr>
+            <a:xfrm flipV="1">
+              <a:off x="3402872" y="2018169"/>
+              <a:ext cx="345385" cy="342890"/>
+            </a:xfrm>
+            <a:prstGeom prst="rect">
+              <a:avLst/>
+            </a:prstGeom>
+            <a:solidFill>
+              <a:schemeClr val="accent4">
+                <a:lumMod val="40000"/>
+                <a:lumOff val="60000"/>
+              </a:schemeClr>
+            </a:solidFill>
+            <a:ln>
+              <a:solidFill>
+                <a:schemeClr val="bg1"/>
+              </a:solidFill>
+            </a:ln>
+          </p:spPr>
+          <p:style>
+            <a:lnRef idx="2">
+              <a:schemeClr val="accent1">
+                <a:shade val="50000"/>
+              </a:schemeClr>
+            </a:lnRef>
+            <a:fillRef idx="1">
+              <a:schemeClr val="accent1"/>
+            </a:fillRef>
+            <a:effectRef idx="0">
+              <a:schemeClr val="accent1"/>
+            </a:effectRef>
+            <a:fontRef idx="minor">
+              <a:schemeClr val="lt1"/>
+            </a:fontRef>
+          </p:style>
+          <p:txBody>
+            <a:bodyPr rtlCol="0" anchor="ctr"/>
+            <a:lstStyle/>
+            <a:p>
+              <a:pPr algn="ctr"/>
+              <a:endParaRPr lang="ko-KR" altLang="en-US" dirty="0"/>
+            </a:p>
+          </p:txBody>
+        </p:sp>
+        <p:sp>
+          <p:nvSpPr>
+            <p:cNvPr id="165" name="화살표: 위쪽 164">
+              <a:extLst>
+                <a:ext uri="{FF2B5EF4-FFF2-40B4-BE49-F238E27FC236}">
+                  <a16:creationId xmlns:a16="http://schemas.microsoft.com/office/drawing/2014/main" id="{7EC1CA8D-0460-4E10-B1BE-6BACE906B548}"/>
+                </a:ext>
+              </a:extLst>
+            </p:cNvPr>
+            <p:cNvSpPr/>
+            <p:nvPr/>
+          </p:nvSpPr>
+          <p:spPr>
+            <a:xfrm rot="5400000">
+              <a:off x="3462088" y="2106973"/>
+              <a:ext cx="226951" cy="150013"/>
+            </a:xfrm>
+            <a:prstGeom prst="upArrow">
+              <a:avLst/>
+            </a:prstGeom>
+            <a:solidFill>
+              <a:srgbClr val="FF0000"/>
+            </a:solidFill>
+            <a:ln>
+              <a:solidFill>
+                <a:schemeClr val="bg2">
+                  <a:lumMod val="25000"/>
+                </a:schemeClr>
+              </a:solidFill>
+            </a:ln>
+          </p:spPr>
+          <p:style>
+            <a:lnRef idx="2">
+              <a:schemeClr val="accent1">
+                <a:shade val="50000"/>
+              </a:schemeClr>
+            </a:lnRef>
+            <a:fillRef idx="1">
+              <a:schemeClr val="accent1"/>
+            </a:fillRef>
+            <a:effectRef idx="0">
+              <a:schemeClr val="accent1"/>
+            </a:effectRef>
+            <a:fontRef idx="minor">
+              <a:schemeClr val="lt1"/>
+            </a:fontRef>
+          </p:style>
+          <p:txBody>
+            <a:bodyPr rtlCol="0" anchor="ctr"/>
+            <a:lstStyle/>
+            <a:p>
+              <a:pPr algn="ctr"/>
+              <a:endParaRPr lang="ko-KR" altLang="en-US"/>
+            </a:p>
+          </p:txBody>
+        </p:sp>
+      </p:grpSp>
+      <p:grpSp>
+        <p:nvGrpSpPr>
+          <p:cNvPr id="166" name="그룹 165">
+            <a:extLst>
+              <a:ext uri="{FF2B5EF4-FFF2-40B4-BE49-F238E27FC236}">
+                <a16:creationId xmlns:a16="http://schemas.microsoft.com/office/drawing/2014/main" id="{EF86A09A-4195-448E-AD5B-3AFB15FC93A1}"/>
+              </a:ext>
+            </a:extLst>
+          </p:cNvPr>
+          <p:cNvGrpSpPr/>
+          <p:nvPr/>
+        </p:nvGrpSpPr>
+        <p:grpSpPr>
+          <a:xfrm>
+            <a:off x="6594700" y="1570747"/>
+            <a:ext cx="345385" cy="342890"/>
+            <a:chOff x="4177683" y="2018169"/>
+            <a:chExt cx="345385" cy="342890"/>
+          </a:xfrm>
+        </p:grpSpPr>
+        <p:sp>
+          <p:nvSpPr>
+            <p:cNvPr id="167" name="직사각형 166">
+              <a:extLst>
+                <a:ext uri="{FF2B5EF4-FFF2-40B4-BE49-F238E27FC236}">
+                  <a16:creationId xmlns:a16="http://schemas.microsoft.com/office/drawing/2014/main" id="{3B3B69B8-4127-4110-8963-2FAA5C8DFF5E}"/>
+                </a:ext>
+              </a:extLst>
+            </p:cNvPr>
+            <p:cNvSpPr/>
+            <p:nvPr/>
+          </p:nvSpPr>
+          <p:spPr>
+            <a:xfrm flipV="1">
+              <a:off x="4177683" y="2018169"/>
+              <a:ext cx="345385" cy="342890"/>
+            </a:xfrm>
+            <a:prstGeom prst="rect">
+              <a:avLst/>
+            </a:prstGeom>
+            <a:solidFill>
+              <a:schemeClr val="accent4">
+                <a:lumMod val="40000"/>
+                <a:lumOff val="60000"/>
+              </a:schemeClr>
+            </a:solidFill>
+            <a:ln>
+              <a:solidFill>
+                <a:schemeClr val="bg1"/>
+              </a:solidFill>
+            </a:ln>
+          </p:spPr>
+          <p:style>
+            <a:lnRef idx="2">
+              <a:schemeClr val="accent1">
+                <a:shade val="50000"/>
+              </a:schemeClr>
+            </a:lnRef>
+            <a:fillRef idx="1">
+              <a:schemeClr val="accent1"/>
+            </a:fillRef>
+            <a:effectRef idx="0">
+              <a:schemeClr val="accent1"/>
+            </a:effectRef>
+            <a:fontRef idx="minor">
+              <a:schemeClr val="lt1"/>
+            </a:fontRef>
+          </p:style>
+          <p:txBody>
+            <a:bodyPr rtlCol="0" anchor="ctr"/>
+            <a:lstStyle/>
+            <a:p>
+              <a:pPr algn="ctr"/>
+              <a:endParaRPr lang="ko-KR" altLang="en-US" dirty="0"/>
+            </a:p>
+          </p:txBody>
+        </p:sp>
+        <p:sp>
+          <p:nvSpPr>
+            <p:cNvPr id="168" name="화살표: 위쪽 167">
+              <a:extLst>
+                <a:ext uri="{FF2B5EF4-FFF2-40B4-BE49-F238E27FC236}">
+                  <a16:creationId xmlns:a16="http://schemas.microsoft.com/office/drawing/2014/main" id="{D62A772B-2876-4890-92D0-CEFE708F66D7}"/>
+                </a:ext>
+              </a:extLst>
+            </p:cNvPr>
+            <p:cNvSpPr/>
+            <p:nvPr/>
+          </p:nvSpPr>
+          <p:spPr>
+            <a:xfrm rot="10800000">
+              <a:off x="4262040" y="2083230"/>
+              <a:ext cx="160014" cy="212768"/>
+            </a:xfrm>
+            <a:prstGeom prst="upArrow">
+              <a:avLst/>
+            </a:prstGeom>
+            <a:solidFill>
+              <a:srgbClr val="FF0000"/>
+            </a:solidFill>
+            <a:ln>
+              <a:solidFill>
+                <a:schemeClr val="bg2">
+                  <a:lumMod val="25000"/>
+                </a:schemeClr>
+              </a:solidFill>
+            </a:ln>
+          </p:spPr>
+          <p:style>
+            <a:lnRef idx="2">
+              <a:schemeClr val="accent1">
+                <a:shade val="50000"/>
+              </a:schemeClr>
+            </a:lnRef>
+            <a:fillRef idx="1">
+              <a:schemeClr val="accent1"/>
+            </a:fillRef>
+            <a:effectRef idx="0">
+              <a:schemeClr val="accent1"/>
+            </a:effectRef>
+            <a:fontRef idx="minor">
+              <a:schemeClr val="lt1"/>
+            </a:fontRef>
+          </p:style>
+          <p:txBody>
+            <a:bodyPr rtlCol="0" anchor="ctr"/>
+            <a:lstStyle/>
+            <a:p>
+              <a:pPr algn="ctr"/>
+              <a:endParaRPr lang="ko-KR" altLang="en-US"/>
+            </a:p>
+          </p:txBody>
+        </p:sp>
+      </p:grpSp>
+      <p:grpSp>
+        <p:nvGrpSpPr>
+          <p:cNvPr id="169" name="그룹 168">
+            <a:extLst>
+              <a:ext uri="{FF2B5EF4-FFF2-40B4-BE49-F238E27FC236}">
+                <a16:creationId xmlns:a16="http://schemas.microsoft.com/office/drawing/2014/main" id="{9479945A-1812-48AE-9698-955B65CC6F2B}"/>
+              </a:ext>
+            </a:extLst>
+          </p:cNvPr>
+          <p:cNvGrpSpPr/>
+          <p:nvPr/>
+        </p:nvGrpSpPr>
+        <p:grpSpPr>
+          <a:xfrm>
+            <a:off x="4246162" y="1570747"/>
+            <a:ext cx="345385" cy="342890"/>
+            <a:chOff x="1829145" y="2018169"/>
+            <a:chExt cx="345385" cy="342890"/>
+          </a:xfrm>
+        </p:grpSpPr>
+        <p:sp>
+          <p:nvSpPr>
+            <p:cNvPr id="170" name="직사각형 169">
+              <a:extLst>
+                <a:ext uri="{FF2B5EF4-FFF2-40B4-BE49-F238E27FC236}">
+                  <a16:creationId xmlns:a16="http://schemas.microsoft.com/office/drawing/2014/main" id="{64D4F978-8472-4A8F-8D27-92134A42C299}"/>
+                </a:ext>
+              </a:extLst>
+            </p:cNvPr>
+            <p:cNvSpPr/>
+            <p:nvPr/>
+          </p:nvSpPr>
+          <p:spPr>
+            <a:xfrm flipV="1">
+              <a:off x="1829145" y="2018169"/>
+              <a:ext cx="345385" cy="342890"/>
+            </a:xfrm>
+            <a:prstGeom prst="rect">
+              <a:avLst/>
+            </a:prstGeom>
+            <a:solidFill>
+              <a:schemeClr val="accent4">
+                <a:lumMod val="40000"/>
+                <a:lumOff val="60000"/>
+              </a:schemeClr>
+            </a:solidFill>
+            <a:ln>
+              <a:solidFill>
+                <a:schemeClr val="bg1"/>
+              </a:solidFill>
+            </a:ln>
+          </p:spPr>
+          <p:style>
+            <a:lnRef idx="2">
+              <a:schemeClr val="accent1">
+                <a:shade val="50000"/>
+              </a:schemeClr>
+            </a:lnRef>
+            <a:fillRef idx="1">
+              <a:schemeClr val="accent1"/>
+            </a:fillRef>
+            <a:effectRef idx="0">
+              <a:schemeClr val="accent1"/>
+            </a:effectRef>
+            <a:fontRef idx="minor">
+              <a:schemeClr val="lt1"/>
+            </a:fontRef>
+          </p:style>
+          <p:txBody>
+            <a:bodyPr rtlCol="0" anchor="ctr"/>
+            <a:lstStyle/>
+            <a:p>
+              <a:pPr algn="ctr"/>
+              <a:endParaRPr lang="ko-KR" altLang="en-US" dirty="0"/>
+            </a:p>
+          </p:txBody>
+        </p:sp>
+        <p:sp>
+          <p:nvSpPr>
+            <p:cNvPr id="171" name="화살표: 위쪽 170">
+              <a:extLst>
+                <a:ext uri="{FF2B5EF4-FFF2-40B4-BE49-F238E27FC236}">
+                  <a16:creationId xmlns:a16="http://schemas.microsoft.com/office/drawing/2014/main" id="{F0015232-7502-4BB4-B75E-9820E423C00E}"/>
+                </a:ext>
+              </a:extLst>
+            </p:cNvPr>
+            <p:cNvSpPr/>
+            <p:nvPr/>
+          </p:nvSpPr>
+          <p:spPr>
+            <a:xfrm rot="16200000">
+              <a:off x="1888360" y="2115640"/>
+              <a:ext cx="226953" cy="150015"/>
+            </a:xfrm>
+            <a:prstGeom prst="upArrow">
+              <a:avLst/>
+            </a:prstGeom>
+            <a:solidFill>
+              <a:srgbClr val="FF0000"/>
+            </a:solidFill>
+            <a:ln>
+              <a:solidFill>
+                <a:schemeClr val="bg2">
+                  <a:lumMod val="25000"/>
+                </a:schemeClr>
+              </a:solidFill>
+            </a:ln>
+          </p:spPr>
+          <p:style>
+            <a:lnRef idx="2">
+              <a:schemeClr val="accent1">
+                <a:shade val="50000"/>
+              </a:schemeClr>
+            </a:lnRef>
+            <a:fillRef idx="1">
+              <a:schemeClr val="accent1"/>
+            </a:fillRef>
+            <a:effectRef idx="0">
+              <a:schemeClr val="accent1"/>
+            </a:effectRef>
+            <a:fontRef idx="minor">
+              <a:schemeClr val="lt1"/>
+            </a:fontRef>
+          </p:style>
+          <p:txBody>
+            <a:bodyPr rtlCol="0" anchor="ctr"/>
+            <a:lstStyle/>
+            <a:p>
+              <a:pPr algn="ctr"/>
+              <a:endParaRPr lang="ko-KR" altLang="en-US"/>
+            </a:p>
+          </p:txBody>
+        </p:sp>
+      </p:grpSp>
     </p:spTree>
     <p:extLst>
       <p:ext uri="{BB962C8B-B14F-4D97-AF65-F5344CB8AC3E}">
@@ -18602,6 +19139,572 @@
     <p:extLst>
       <p:ext uri="{BB962C8B-B14F-4D97-AF65-F5344CB8AC3E}">
         <p14:creationId xmlns:p14="http://schemas.microsoft.com/office/powerpoint/2010/main" val="3693275655"/>
+      </p:ext>
+    </p:extLst>
+  </p:cSld>
+  <p:clrMapOvr>
+    <a:masterClrMapping/>
+  </p:clrMapOvr>
+</p:sld>
+</file>
+
+<file path=ppt/slides/slide5.xml><?xml version="1.0" encoding="utf-8"?>
+<p:sld xmlns:a="http://schemas.openxmlformats.org/drawingml/2006/main" xmlns:r="http://schemas.openxmlformats.org/officeDocument/2006/relationships" xmlns:p="http://schemas.openxmlformats.org/presentationml/2006/main">
+  <p:cSld>
+    <p:spTree>
+      <p:nvGrpSpPr>
+        <p:cNvPr id="1" name=""/>
+        <p:cNvGrpSpPr/>
+        <p:nvPr/>
+      </p:nvGrpSpPr>
+      <p:grpSpPr>
+        <a:xfrm>
+          <a:off x="0" y="0"/>
+          <a:ext cx="0" cy="0"/>
+          <a:chOff x="0" y="0"/>
+          <a:chExt cx="0" cy="0"/>
+        </a:xfrm>
+      </p:grpSpPr>
+      <p:grpSp>
+        <p:nvGrpSpPr>
+          <p:cNvPr id="28" name="그룹 27">
+            <a:extLst>
+              <a:ext uri="{FF2B5EF4-FFF2-40B4-BE49-F238E27FC236}">
+                <a16:creationId xmlns:a16="http://schemas.microsoft.com/office/drawing/2014/main" id="{2817541D-9F93-4186-B2BE-AEE8B5DBF0F4}"/>
+              </a:ext>
+            </a:extLst>
+          </p:cNvPr>
+          <p:cNvGrpSpPr/>
+          <p:nvPr/>
+        </p:nvGrpSpPr>
+        <p:grpSpPr>
+          <a:xfrm>
+            <a:off x="2583977" y="2018169"/>
+            <a:ext cx="345385" cy="342890"/>
+            <a:chOff x="2583977" y="2018169"/>
+            <a:chExt cx="345385" cy="342890"/>
+          </a:xfrm>
+        </p:grpSpPr>
+        <p:sp>
+          <p:nvSpPr>
+            <p:cNvPr id="5" name="직사각형 4">
+              <a:extLst>
+                <a:ext uri="{FF2B5EF4-FFF2-40B4-BE49-F238E27FC236}">
+                  <a16:creationId xmlns:a16="http://schemas.microsoft.com/office/drawing/2014/main" id="{F8D0C49F-4D5E-4F99-AAB8-E912C33228FE}"/>
+                </a:ext>
+              </a:extLst>
+            </p:cNvPr>
+            <p:cNvSpPr/>
+            <p:nvPr/>
+          </p:nvSpPr>
+          <p:spPr>
+            <a:xfrm flipV="1">
+              <a:off x="2583977" y="2018169"/>
+              <a:ext cx="345385" cy="342890"/>
+            </a:xfrm>
+            <a:prstGeom prst="rect">
+              <a:avLst/>
+            </a:prstGeom>
+            <a:solidFill>
+              <a:schemeClr val="accent4">
+                <a:lumMod val="40000"/>
+                <a:lumOff val="60000"/>
+              </a:schemeClr>
+            </a:solidFill>
+            <a:ln>
+              <a:solidFill>
+                <a:schemeClr val="bg1"/>
+              </a:solidFill>
+            </a:ln>
+          </p:spPr>
+          <p:style>
+            <a:lnRef idx="2">
+              <a:schemeClr val="accent1">
+                <a:shade val="50000"/>
+              </a:schemeClr>
+            </a:lnRef>
+            <a:fillRef idx="1">
+              <a:schemeClr val="accent1"/>
+            </a:fillRef>
+            <a:effectRef idx="0">
+              <a:schemeClr val="accent1"/>
+            </a:effectRef>
+            <a:fontRef idx="minor">
+              <a:schemeClr val="lt1"/>
+            </a:fontRef>
+          </p:style>
+          <p:txBody>
+            <a:bodyPr rtlCol="0" anchor="ctr"/>
+            <a:lstStyle/>
+            <a:p>
+              <a:pPr algn="ctr"/>
+              <a:endParaRPr lang="ko-KR" altLang="en-US" dirty="0"/>
+            </a:p>
+          </p:txBody>
+        </p:sp>
+        <p:sp>
+          <p:nvSpPr>
+            <p:cNvPr id="6" name="화살표: 위쪽 5">
+              <a:extLst>
+                <a:ext uri="{FF2B5EF4-FFF2-40B4-BE49-F238E27FC236}">
+                  <a16:creationId xmlns:a16="http://schemas.microsoft.com/office/drawing/2014/main" id="{898FFCCF-CEEC-4EC2-A07C-2AA56399E72A}"/>
+                </a:ext>
+              </a:extLst>
+            </p:cNvPr>
+            <p:cNvSpPr/>
+            <p:nvPr/>
+          </p:nvSpPr>
+          <p:spPr>
+            <a:xfrm>
+              <a:off x="2688972" y="2075595"/>
+              <a:ext cx="160014" cy="212768"/>
+            </a:xfrm>
+            <a:prstGeom prst="upArrow">
+              <a:avLst/>
+            </a:prstGeom>
+            <a:solidFill>
+              <a:srgbClr val="FF0000"/>
+            </a:solidFill>
+            <a:ln>
+              <a:solidFill>
+                <a:schemeClr val="bg2">
+                  <a:lumMod val="25000"/>
+                </a:schemeClr>
+              </a:solidFill>
+            </a:ln>
+          </p:spPr>
+          <p:style>
+            <a:lnRef idx="2">
+              <a:schemeClr val="accent1">
+                <a:shade val="50000"/>
+              </a:schemeClr>
+            </a:lnRef>
+            <a:fillRef idx="1">
+              <a:schemeClr val="accent1"/>
+            </a:fillRef>
+            <a:effectRef idx="0">
+              <a:schemeClr val="accent1"/>
+            </a:effectRef>
+            <a:fontRef idx="minor">
+              <a:schemeClr val="lt1"/>
+            </a:fontRef>
+          </p:style>
+          <p:txBody>
+            <a:bodyPr rtlCol="0" anchor="ctr"/>
+            <a:lstStyle/>
+            <a:p>
+              <a:pPr algn="ctr"/>
+              <a:endParaRPr lang="ko-KR" altLang="en-US"/>
+            </a:p>
+          </p:txBody>
+        </p:sp>
+      </p:grpSp>
+      <p:grpSp>
+        <p:nvGrpSpPr>
+          <p:cNvPr id="27" name="그룹 26">
+            <a:extLst>
+              <a:ext uri="{FF2B5EF4-FFF2-40B4-BE49-F238E27FC236}">
+                <a16:creationId xmlns:a16="http://schemas.microsoft.com/office/drawing/2014/main" id="{5692DE06-F03E-4A8B-AB24-6B7FA9CF8B2C}"/>
+              </a:ext>
+            </a:extLst>
+          </p:cNvPr>
+          <p:cNvGrpSpPr/>
+          <p:nvPr/>
+        </p:nvGrpSpPr>
+        <p:grpSpPr>
+          <a:xfrm>
+            <a:off x="3402872" y="2018169"/>
+            <a:ext cx="345385" cy="342890"/>
+            <a:chOff x="3402872" y="2018169"/>
+            <a:chExt cx="345385" cy="342890"/>
+          </a:xfrm>
+        </p:grpSpPr>
+        <p:sp>
+          <p:nvSpPr>
+            <p:cNvPr id="7" name="직사각형 6">
+              <a:extLst>
+                <a:ext uri="{FF2B5EF4-FFF2-40B4-BE49-F238E27FC236}">
+                  <a16:creationId xmlns:a16="http://schemas.microsoft.com/office/drawing/2014/main" id="{4117D6D1-8475-46B1-9470-025DCB8ECB55}"/>
+                </a:ext>
+              </a:extLst>
+            </p:cNvPr>
+            <p:cNvSpPr/>
+            <p:nvPr/>
+          </p:nvSpPr>
+          <p:spPr>
+            <a:xfrm flipV="1">
+              <a:off x="3402872" y="2018169"/>
+              <a:ext cx="345385" cy="342890"/>
+            </a:xfrm>
+            <a:prstGeom prst="rect">
+              <a:avLst/>
+            </a:prstGeom>
+            <a:solidFill>
+              <a:schemeClr val="accent4">
+                <a:lumMod val="40000"/>
+                <a:lumOff val="60000"/>
+              </a:schemeClr>
+            </a:solidFill>
+            <a:ln>
+              <a:solidFill>
+                <a:schemeClr val="bg1"/>
+              </a:solidFill>
+            </a:ln>
+          </p:spPr>
+          <p:style>
+            <a:lnRef idx="2">
+              <a:schemeClr val="accent1">
+                <a:shade val="50000"/>
+              </a:schemeClr>
+            </a:lnRef>
+            <a:fillRef idx="1">
+              <a:schemeClr val="accent1"/>
+            </a:fillRef>
+            <a:effectRef idx="0">
+              <a:schemeClr val="accent1"/>
+            </a:effectRef>
+            <a:fontRef idx="minor">
+              <a:schemeClr val="lt1"/>
+            </a:fontRef>
+          </p:style>
+          <p:txBody>
+            <a:bodyPr rtlCol="0" anchor="ctr"/>
+            <a:lstStyle/>
+            <a:p>
+              <a:pPr algn="ctr"/>
+              <a:endParaRPr lang="ko-KR" altLang="en-US" dirty="0"/>
+            </a:p>
+          </p:txBody>
+        </p:sp>
+        <p:sp>
+          <p:nvSpPr>
+            <p:cNvPr id="8" name="화살표: 위쪽 7">
+              <a:extLst>
+                <a:ext uri="{FF2B5EF4-FFF2-40B4-BE49-F238E27FC236}">
+                  <a16:creationId xmlns:a16="http://schemas.microsoft.com/office/drawing/2014/main" id="{E834D0F2-6E26-4415-B77D-81386BD86042}"/>
+                </a:ext>
+              </a:extLst>
+            </p:cNvPr>
+            <p:cNvSpPr/>
+            <p:nvPr/>
+          </p:nvSpPr>
+          <p:spPr>
+            <a:xfrm rot="5400000">
+              <a:off x="3462088" y="2106973"/>
+              <a:ext cx="226951" cy="150013"/>
+            </a:xfrm>
+            <a:prstGeom prst="upArrow">
+              <a:avLst/>
+            </a:prstGeom>
+            <a:solidFill>
+              <a:srgbClr val="FF0000"/>
+            </a:solidFill>
+            <a:ln>
+              <a:solidFill>
+                <a:schemeClr val="bg2">
+                  <a:lumMod val="25000"/>
+                </a:schemeClr>
+              </a:solidFill>
+            </a:ln>
+          </p:spPr>
+          <p:style>
+            <a:lnRef idx="2">
+              <a:schemeClr val="accent1">
+                <a:shade val="50000"/>
+              </a:schemeClr>
+            </a:lnRef>
+            <a:fillRef idx="1">
+              <a:schemeClr val="accent1"/>
+            </a:fillRef>
+            <a:effectRef idx="0">
+              <a:schemeClr val="accent1"/>
+            </a:effectRef>
+            <a:fontRef idx="minor">
+              <a:schemeClr val="lt1"/>
+            </a:fontRef>
+          </p:style>
+          <p:txBody>
+            <a:bodyPr rtlCol="0" anchor="ctr"/>
+            <a:lstStyle/>
+            <a:p>
+              <a:pPr algn="ctr"/>
+              <a:endParaRPr lang="ko-KR" altLang="en-US"/>
+            </a:p>
+          </p:txBody>
+        </p:sp>
+      </p:grpSp>
+      <p:grpSp>
+        <p:nvGrpSpPr>
+          <p:cNvPr id="26" name="그룹 25">
+            <a:extLst>
+              <a:ext uri="{FF2B5EF4-FFF2-40B4-BE49-F238E27FC236}">
+                <a16:creationId xmlns:a16="http://schemas.microsoft.com/office/drawing/2014/main" id="{B4CF8696-20CB-4F7E-A47C-3D96071999EF}"/>
+              </a:ext>
+            </a:extLst>
+          </p:cNvPr>
+          <p:cNvGrpSpPr/>
+          <p:nvPr/>
+        </p:nvGrpSpPr>
+        <p:grpSpPr>
+          <a:xfrm>
+            <a:off x="4177683" y="2018169"/>
+            <a:ext cx="345385" cy="342890"/>
+            <a:chOff x="4177683" y="2018169"/>
+            <a:chExt cx="345385" cy="342890"/>
+          </a:xfrm>
+        </p:grpSpPr>
+        <p:sp>
+          <p:nvSpPr>
+            <p:cNvPr id="9" name="직사각형 8">
+              <a:extLst>
+                <a:ext uri="{FF2B5EF4-FFF2-40B4-BE49-F238E27FC236}">
+                  <a16:creationId xmlns:a16="http://schemas.microsoft.com/office/drawing/2014/main" id="{A5B51AA8-1974-4827-8BCA-BE91CC6EC9D2}"/>
+                </a:ext>
+              </a:extLst>
+            </p:cNvPr>
+            <p:cNvSpPr/>
+            <p:nvPr/>
+          </p:nvSpPr>
+          <p:spPr>
+            <a:xfrm flipV="1">
+              <a:off x="4177683" y="2018169"/>
+              <a:ext cx="345385" cy="342890"/>
+            </a:xfrm>
+            <a:prstGeom prst="rect">
+              <a:avLst/>
+            </a:prstGeom>
+            <a:solidFill>
+              <a:schemeClr val="accent4">
+                <a:lumMod val="40000"/>
+                <a:lumOff val="60000"/>
+              </a:schemeClr>
+            </a:solidFill>
+            <a:ln>
+              <a:solidFill>
+                <a:schemeClr val="bg1"/>
+              </a:solidFill>
+            </a:ln>
+          </p:spPr>
+          <p:style>
+            <a:lnRef idx="2">
+              <a:schemeClr val="accent1">
+                <a:shade val="50000"/>
+              </a:schemeClr>
+            </a:lnRef>
+            <a:fillRef idx="1">
+              <a:schemeClr val="accent1"/>
+            </a:fillRef>
+            <a:effectRef idx="0">
+              <a:schemeClr val="accent1"/>
+            </a:effectRef>
+            <a:fontRef idx="minor">
+              <a:schemeClr val="lt1"/>
+            </a:fontRef>
+          </p:style>
+          <p:txBody>
+            <a:bodyPr rtlCol="0" anchor="ctr"/>
+            <a:lstStyle/>
+            <a:p>
+              <a:pPr algn="ctr"/>
+              <a:endParaRPr lang="ko-KR" altLang="en-US" dirty="0"/>
+            </a:p>
+          </p:txBody>
+        </p:sp>
+        <p:sp>
+          <p:nvSpPr>
+            <p:cNvPr id="10" name="화살표: 위쪽 9">
+              <a:extLst>
+                <a:ext uri="{FF2B5EF4-FFF2-40B4-BE49-F238E27FC236}">
+                  <a16:creationId xmlns:a16="http://schemas.microsoft.com/office/drawing/2014/main" id="{56045301-8798-43DD-8019-92B04C9A6DD6}"/>
+                </a:ext>
+              </a:extLst>
+            </p:cNvPr>
+            <p:cNvSpPr/>
+            <p:nvPr/>
+          </p:nvSpPr>
+          <p:spPr>
+            <a:xfrm rot="10800000">
+              <a:off x="4262040" y="2083230"/>
+              <a:ext cx="160014" cy="212768"/>
+            </a:xfrm>
+            <a:prstGeom prst="upArrow">
+              <a:avLst/>
+            </a:prstGeom>
+            <a:solidFill>
+              <a:srgbClr val="FF0000"/>
+            </a:solidFill>
+            <a:ln>
+              <a:solidFill>
+                <a:schemeClr val="bg2">
+                  <a:lumMod val="25000"/>
+                </a:schemeClr>
+              </a:solidFill>
+            </a:ln>
+          </p:spPr>
+          <p:style>
+            <a:lnRef idx="2">
+              <a:schemeClr val="accent1">
+                <a:shade val="50000"/>
+              </a:schemeClr>
+            </a:lnRef>
+            <a:fillRef idx="1">
+              <a:schemeClr val="accent1"/>
+            </a:fillRef>
+            <a:effectRef idx="0">
+              <a:schemeClr val="accent1"/>
+            </a:effectRef>
+            <a:fontRef idx="minor">
+              <a:schemeClr val="lt1"/>
+            </a:fontRef>
+          </p:style>
+          <p:txBody>
+            <a:bodyPr rtlCol="0" anchor="ctr"/>
+            <a:lstStyle/>
+            <a:p>
+              <a:pPr algn="ctr"/>
+              <a:endParaRPr lang="ko-KR" altLang="en-US"/>
+            </a:p>
+          </p:txBody>
+        </p:sp>
+      </p:grpSp>
+      <p:grpSp>
+        <p:nvGrpSpPr>
+          <p:cNvPr id="29" name="그룹 28">
+            <a:extLst>
+              <a:ext uri="{FF2B5EF4-FFF2-40B4-BE49-F238E27FC236}">
+                <a16:creationId xmlns:a16="http://schemas.microsoft.com/office/drawing/2014/main" id="{F2796B7C-6CB1-4056-917A-D272907FA3ED}"/>
+              </a:ext>
+            </a:extLst>
+          </p:cNvPr>
+          <p:cNvGrpSpPr/>
+          <p:nvPr/>
+        </p:nvGrpSpPr>
+        <p:grpSpPr>
+          <a:xfrm>
+            <a:off x="1829145" y="2018169"/>
+            <a:ext cx="345385" cy="342890"/>
+            <a:chOff x="1829145" y="2018169"/>
+            <a:chExt cx="345385" cy="342890"/>
+          </a:xfrm>
+        </p:grpSpPr>
+        <p:sp>
+          <p:nvSpPr>
+            <p:cNvPr id="11" name="직사각형 10">
+              <a:extLst>
+                <a:ext uri="{FF2B5EF4-FFF2-40B4-BE49-F238E27FC236}">
+                  <a16:creationId xmlns:a16="http://schemas.microsoft.com/office/drawing/2014/main" id="{2C6AA213-241E-4679-83DA-C047BF55D878}"/>
+                </a:ext>
+              </a:extLst>
+            </p:cNvPr>
+            <p:cNvSpPr/>
+            <p:nvPr/>
+          </p:nvSpPr>
+          <p:spPr>
+            <a:xfrm flipV="1">
+              <a:off x="1829145" y="2018169"/>
+              <a:ext cx="345385" cy="342890"/>
+            </a:xfrm>
+            <a:prstGeom prst="rect">
+              <a:avLst/>
+            </a:prstGeom>
+            <a:solidFill>
+              <a:schemeClr val="accent4">
+                <a:lumMod val="40000"/>
+                <a:lumOff val="60000"/>
+              </a:schemeClr>
+            </a:solidFill>
+            <a:ln>
+              <a:solidFill>
+                <a:schemeClr val="bg1"/>
+              </a:solidFill>
+            </a:ln>
+          </p:spPr>
+          <p:style>
+            <a:lnRef idx="2">
+              <a:schemeClr val="accent1">
+                <a:shade val="50000"/>
+              </a:schemeClr>
+            </a:lnRef>
+            <a:fillRef idx="1">
+              <a:schemeClr val="accent1"/>
+            </a:fillRef>
+            <a:effectRef idx="0">
+              <a:schemeClr val="accent1"/>
+            </a:effectRef>
+            <a:fontRef idx="minor">
+              <a:schemeClr val="lt1"/>
+            </a:fontRef>
+          </p:style>
+          <p:txBody>
+            <a:bodyPr rtlCol="0" anchor="ctr"/>
+            <a:lstStyle/>
+            <a:p>
+              <a:pPr algn="ctr"/>
+              <a:endParaRPr lang="ko-KR" altLang="en-US" dirty="0"/>
+            </a:p>
+          </p:txBody>
+        </p:sp>
+        <p:sp>
+          <p:nvSpPr>
+            <p:cNvPr id="12" name="화살표: 위쪽 11">
+              <a:extLst>
+                <a:ext uri="{FF2B5EF4-FFF2-40B4-BE49-F238E27FC236}">
+                  <a16:creationId xmlns:a16="http://schemas.microsoft.com/office/drawing/2014/main" id="{F304B186-0387-4D85-B119-16D1E2546039}"/>
+                </a:ext>
+              </a:extLst>
+            </p:cNvPr>
+            <p:cNvSpPr/>
+            <p:nvPr/>
+          </p:nvSpPr>
+          <p:spPr>
+            <a:xfrm rot="16200000">
+              <a:off x="1888360" y="2115640"/>
+              <a:ext cx="226953" cy="150015"/>
+            </a:xfrm>
+            <a:prstGeom prst="upArrow">
+              <a:avLst/>
+            </a:prstGeom>
+            <a:solidFill>
+              <a:srgbClr val="FF0000"/>
+            </a:solidFill>
+            <a:ln>
+              <a:solidFill>
+                <a:schemeClr val="bg2">
+                  <a:lumMod val="25000"/>
+                </a:schemeClr>
+              </a:solidFill>
+            </a:ln>
+          </p:spPr>
+          <p:style>
+            <a:lnRef idx="2">
+              <a:schemeClr val="accent1">
+                <a:shade val="50000"/>
+              </a:schemeClr>
+            </a:lnRef>
+            <a:fillRef idx="1">
+              <a:schemeClr val="accent1"/>
+            </a:fillRef>
+            <a:effectRef idx="0">
+              <a:schemeClr val="accent1"/>
+            </a:effectRef>
+            <a:fontRef idx="minor">
+              <a:schemeClr val="lt1"/>
+            </a:fontRef>
+          </p:style>
+          <p:txBody>
+            <a:bodyPr rtlCol="0" anchor="ctr"/>
+            <a:lstStyle/>
+            <a:p>
+              <a:pPr algn="ctr"/>
+              <a:endParaRPr lang="ko-KR" altLang="en-US"/>
+            </a:p>
+          </p:txBody>
+        </p:sp>
+      </p:grpSp>
+    </p:spTree>
+    <p:extLst>
+      <p:ext uri="{BB962C8B-B14F-4D97-AF65-F5344CB8AC3E}">
+        <p14:creationId xmlns:p14="http://schemas.microsoft.com/office/powerpoint/2010/main" val="3257928193"/>
       </p:ext>
     </p:extLst>
   </p:cSld>

</xml_diff>